<commit_message>
Updated scits 2015 abstract draft
</commit_message>
<xml_diff>
--- a/articles/scits_2015/figures/fig1.pptx
+++ b/articles/scits_2015/figures/fig1.pptx
@@ -194,7 +194,7 @@
           <a:p>
             <a:fld id="{502F89A4-9858-8A41-A2F1-ECFE4E7EC2C8}" type="datetimeFigureOut">
               <a:rPr lang="en-US" smtClean="0"/>
-              <a:t>2/26/15</a:t>
+              <a:t>2/27/15</a:t>
             </a:fld>
             <a:endParaRPr lang="en-US"/>
           </a:p>
@@ -727,7 +727,7 @@
           <a:p>
             <a:fld id="{058E2CE5-C389-C54B-BC2D-63998956EC3B}" type="datetimeFigureOut">
               <a:rPr lang="en-US" smtClean="0"/>
-              <a:t>2/26/15</a:t>
+              <a:t>2/27/15</a:t>
             </a:fld>
             <a:endParaRPr lang="en-US"/>
           </a:p>
@@ -897,7 +897,7 @@
           <a:p>
             <a:fld id="{058E2CE5-C389-C54B-BC2D-63998956EC3B}" type="datetimeFigureOut">
               <a:rPr lang="en-US" smtClean="0"/>
-              <a:t>2/26/15</a:t>
+              <a:t>2/27/15</a:t>
             </a:fld>
             <a:endParaRPr lang="en-US"/>
           </a:p>
@@ -1077,7 +1077,7 @@
           <a:p>
             <a:fld id="{058E2CE5-C389-C54B-BC2D-63998956EC3B}" type="datetimeFigureOut">
               <a:rPr lang="en-US" smtClean="0"/>
-              <a:t>2/26/15</a:t>
+              <a:t>2/27/15</a:t>
             </a:fld>
             <a:endParaRPr lang="en-US"/>
           </a:p>
@@ -1247,7 +1247,7 @@
           <a:p>
             <a:fld id="{058E2CE5-C389-C54B-BC2D-63998956EC3B}" type="datetimeFigureOut">
               <a:rPr lang="en-US" smtClean="0"/>
-              <a:t>2/26/15</a:t>
+              <a:t>2/27/15</a:t>
             </a:fld>
             <a:endParaRPr lang="en-US"/>
           </a:p>
@@ -1493,7 +1493,7 @@
           <a:p>
             <a:fld id="{058E2CE5-C389-C54B-BC2D-63998956EC3B}" type="datetimeFigureOut">
               <a:rPr lang="en-US" smtClean="0"/>
-              <a:t>2/26/15</a:t>
+              <a:t>2/27/15</a:t>
             </a:fld>
             <a:endParaRPr lang="en-US"/>
           </a:p>
@@ -1781,7 +1781,7 @@
           <a:p>
             <a:fld id="{058E2CE5-C389-C54B-BC2D-63998956EC3B}" type="datetimeFigureOut">
               <a:rPr lang="en-US" smtClean="0"/>
-              <a:t>2/26/15</a:t>
+              <a:t>2/27/15</a:t>
             </a:fld>
             <a:endParaRPr lang="en-US"/>
           </a:p>
@@ -2203,7 +2203,7 @@
           <a:p>
             <a:fld id="{058E2CE5-C389-C54B-BC2D-63998956EC3B}" type="datetimeFigureOut">
               <a:rPr lang="en-US" smtClean="0"/>
-              <a:t>2/26/15</a:t>
+              <a:t>2/27/15</a:t>
             </a:fld>
             <a:endParaRPr lang="en-US"/>
           </a:p>
@@ -2321,7 +2321,7 @@
           <a:p>
             <a:fld id="{058E2CE5-C389-C54B-BC2D-63998956EC3B}" type="datetimeFigureOut">
               <a:rPr lang="en-US" smtClean="0"/>
-              <a:t>2/26/15</a:t>
+              <a:t>2/27/15</a:t>
             </a:fld>
             <a:endParaRPr lang="en-US"/>
           </a:p>
@@ -2416,7 +2416,7 @@
           <a:p>
             <a:fld id="{058E2CE5-C389-C54B-BC2D-63998956EC3B}" type="datetimeFigureOut">
               <a:rPr lang="en-US" smtClean="0"/>
-              <a:t>2/26/15</a:t>
+              <a:t>2/27/15</a:t>
             </a:fld>
             <a:endParaRPr lang="en-US"/>
           </a:p>
@@ -2693,7 +2693,7 @@
           <a:p>
             <a:fld id="{058E2CE5-C389-C54B-BC2D-63998956EC3B}" type="datetimeFigureOut">
               <a:rPr lang="en-US" smtClean="0"/>
-              <a:t>2/26/15</a:t>
+              <a:t>2/27/15</a:t>
             </a:fld>
             <a:endParaRPr lang="en-US"/>
           </a:p>
@@ -2946,7 +2946,7 @@
           <a:p>
             <a:fld id="{058E2CE5-C389-C54B-BC2D-63998956EC3B}" type="datetimeFigureOut">
               <a:rPr lang="en-US" smtClean="0"/>
-              <a:t>2/26/15</a:t>
+              <a:t>2/27/15</a:t>
             </a:fld>
             <a:endParaRPr lang="en-US"/>
           </a:p>
@@ -3159,7 +3159,7 @@
           <a:p>
             <a:fld id="{058E2CE5-C389-C54B-BC2D-63998956EC3B}" type="datetimeFigureOut">
               <a:rPr lang="en-US" smtClean="0"/>
-              <a:t>2/26/15</a:t>
+              <a:t>2/27/15</a:t>
             </a:fld>
             <a:endParaRPr lang="en-US"/>
           </a:p>
@@ -3916,10 +3916,6 @@
                 </a:rPr>
                 <a:t></a:t>
               </a:r>
-              <a:endParaRPr lang="en-US" sz="3200" dirty="0">
-                <a:latin typeface="FontAwesome Regular"/>
-                <a:cs typeface="FontAwesome Regular"/>
-              </a:endParaRPr>
             </a:p>
           </p:txBody>
         </p:sp>
@@ -3988,10 +3984,6 @@
                 </a:rPr>
                 <a:t></a:t>
               </a:r>
-              <a:endParaRPr lang="en-US" sz="3200" dirty="0">
-                <a:latin typeface="FontAwesome Regular"/>
-                <a:cs typeface="FontAwesome Regular"/>
-              </a:endParaRPr>
             </a:p>
           </p:txBody>
         </p:sp>
@@ -4820,8 +4812,8 @@
         </p:nvSpPr>
         <p:spPr>
           <a:xfrm>
-            <a:off x="5845665" y="3639659"/>
-            <a:ext cx="1789140" cy="646331"/>
+            <a:off x="5577043" y="3639659"/>
+            <a:ext cx="2326394" cy="646331"/>
           </a:xfrm>
           <a:prstGeom prst="rect">
             <a:avLst/>
@@ -4839,7 +4831,7 @@
                 <a:latin typeface="Lato Light"/>
                 <a:cs typeface="Lato Light"/>
               </a:rPr>
-              <a:t>Article-reviewer</a:t>
+              <a:t>Estimated manuscript</a:t>
             </a:r>
           </a:p>
           <a:p>
@@ -4849,7 +4841,7 @@
                 <a:latin typeface="Lato Light"/>
                 <a:cs typeface="Lato Light"/>
               </a:rPr>
-              <a:t>assignment</a:t>
+              <a:t>scores</a:t>
             </a:r>
             <a:endParaRPr lang="en-US" dirty="0">
               <a:latin typeface="Lato Light"/>
@@ -5368,6 +5360,33 @@
           </a:p>
         </p:txBody>
       </p:sp>
+      <p:pic>
+        <p:nvPicPr>
+          <p:cNvPr id="2" name="Picture 1"/>
+          <p:cNvPicPr>
+            <a:picLocks noChangeAspect="1"/>
+          </p:cNvPicPr>
+          <p:nvPr/>
+        </p:nvPicPr>
+        <p:blipFill>
+          <a:blip r:embed="rId4"/>
+          <a:stretch>
+            <a:fillRect/>
+          </a:stretch>
+        </p:blipFill>
+        <p:spPr>
+          <a:xfrm>
+            <a:off x="7723034" y="3687047"/>
+            <a:ext cx="1503566" cy="424921"/>
+          </a:xfrm>
+          <a:prstGeom prst="rect">
+            <a:avLst/>
+          </a:prstGeom>
+          <a:solidFill>
+            <a:schemeClr val="bg1"/>
+          </a:solidFill>
+        </p:spPr>
+      </p:pic>
     </p:spTree>
     <p:extLst>
       <p:ext uri="{BB962C8B-B14F-4D97-AF65-F5344CB8AC3E}">

</xml_diff>